<commit_message>
Added slide for ELMs
</commit_message>
<xml_diff>
--- a/JuliaCon 2024 Presentation.pptx
+++ b/JuliaCon 2024 Presentation.pptx
@@ -5,10 +5,10 @@
     <p:sldMasterId id="2147483648" r:id="rId1"/>
   </p:sldMasterIdLst>
   <p:notesMasterIdLst>
-    <p:notesMasterId r:id="rId25"/>
+    <p:notesMasterId r:id="rId26"/>
   </p:notesMasterIdLst>
   <p:handoutMasterIdLst>
-    <p:handoutMasterId r:id="rId26"/>
+    <p:handoutMasterId r:id="rId27"/>
   </p:handoutMasterIdLst>
   <p:sldIdLst>
     <p:sldId id="256" r:id="rId2"/>
@@ -30,10 +30,11 @@
     <p:sldId id="274" r:id="rId18"/>
     <p:sldId id="277" r:id="rId19"/>
     <p:sldId id="275" r:id="rId20"/>
-    <p:sldId id="276" r:id="rId21"/>
-    <p:sldId id="278" r:id="rId22"/>
-    <p:sldId id="279" r:id="rId23"/>
-    <p:sldId id="280" r:id="rId24"/>
+    <p:sldId id="281" r:id="rId21"/>
+    <p:sldId id="276" r:id="rId22"/>
+    <p:sldId id="278" r:id="rId23"/>
+    <p:sldId id="279" r:id="rId24"/>
+    <p:sldId id="280" r:id="rId25"/>
   </p:sldIdLst>
   <p:sldSz cx="12192000" cy="6858000"/>
   <p:notesSz cx="6858000" cy="9144000"/>
@@ -13340,7 +13341,7 @@
           <a:p>
             <a:fld id="{D3010BDA-5139-4E86-A67A-22C4610DC73F}" type="datetimeFigureOut">
               <a:rPr lang="en-US" smtClean="0"/>
-              <a:t>7/6/2024</a:t>
+              <a:t>7/8/2024</a:t>
             </a:fld>
             <a:endParaRPr lang="en-US"/>
           </a:p>
@@ -13521,7 +13522,7 @@
           <a:p>
             <a:fld id="{B27AE39F-5D25-4C56-B6E6-806B2CACEAC4}" type="datetimeFigureOut">
               <a:rPr lang="en-US" smtClean="0"/>
-              <a:t>7/6/2024</a:t>
+              <a:t>7/8/2024</a:t>
             </a:fld>
             <a:endParaRPr lang="en-US"/>
           </a:p>
@@ -13967,7 +13968,7 @@
             </a:pPr>
             <a:r>
               <a:rPr lang="en-US" dirty="0"/>
-              <a:t>One caveat is that if the estimated effect seems way off, don’t panic, try a different activation function</a:t>
+              <a:t>ELM is a special type of single layer neural network that uses randomized weights</a:t>
             </a:r>
           </a:p>
           <a:p>
@@ -13977,7 +13978,7 @@
             </a:pPr>
             <a:r>
               <a:rPr lang="en-US" dirty="0"/>
-              <a:t>Since the weights are not repeatedly updated by gradient descent, different activation functions will constrain the weights further or closer to zero</a:t>
+              <a:t>To train an ELM we generate a matrix of random weights where the number of rows is the number of features and the number of columns is the number of neurons</a:t>
             </a:r>
           </a:p>
           <a:p>
@@ -13987,8 +13988,33 @@
             </a:pPr>
             <a:r>
               <a:rPr lang="en-US" dirty="0"/>
-              <a:t>For example, an aggressive activation like the binary step function will work well if you notice the magnitude of the estimates are way larger than they should be with the default swish activation</a:t>
-            </a:r>
+              <a:t>Then we multiply the weights with the training features and apply an activation function, which gives us our hidden layer H</a:t>
+            </a:r>
+          </a:p>
+          <a:p>
+            <a:pPr marL="171450" indent="-171450">
+              <a:buFontTx/>
+              <a:buChar char="-"/>
+            </a:pPr>
+            <a:r>
+              <a:rPr lang="en-US" dirty="0"/>
+              <a:t>We get output weights by solving the least squares problem, multiplying the pseudoinverse of H with the targets to predict</a:t>
+            </a:r>
+          </a:p>
+          <a:p>
+            <a:pPr marL="171450" indent="-171450">
+              <a:buFontTx/>
+              <a:buChar char="-"/>
+            </a:pPr>
+            <a:r>
+              <a:rPr lang="en-US" dirty="0"/>
+              <a:t>Then, to make predictions we can multiply the test features by the weights, apply our activation function, and multiply this by the output </a:t>
+            </a:r>
+            <a:r>
+              <a:rPr lang="en-US" dirty="0" err="1"/>
+              <a:t>weightst</a:t>
+            </a:r>
+            <a:endParaRPr lang="en-US" dirty="0"/>
           </a:p>
         </p:txBody>
       </p:sp>
@@ -14100,7 +14126,7 @@
             </a:pPr>
             <a:r>
               <a:rPr lang="en-US" dirty="0"/>
-              <a:t>Hopefully somebody in the room gets the Stepbrothers reference</a:t>
+              <a:t>ELM is a special type of single layer neural network that uses randomized weights</a:t>
             </a:r>
           </a:p>
           <a:p>
@@ -14110,7 +14136,23 @@
             </a:pPr>
             <a:r>
               <a:rPr lang="en-US" dirty="0"/>
-              <a:t>In Julia there isn’t a highly developed ecosystem for causal ML like in Python</a:t>
+              <a:t>To get predictions for some features </a:t>
+            </a:r>
+            <a:r>
+              <a:rPr lang="en-US" dirty="0" err="1"/>
+              <a:t>X_test</a:t>
+            </a:r>
+            <a:r>
+              <a:rPr lang="en-US" dirty="0"/>
+              <a:t>, we multiply </a:t>
+            </a:r>
+            <a:r>
+              <a:rPr lang="en-US" dirty="0" err="1"/>
+              <a:t>X_test</a:t>
+            </a:r>
+            <a:r>
+              <a:rPr lang="en-US" dirty="0"/>
+              <a:t> by W transpose, apply an activation function g, and multiply that output by some output weights, beta</a:t>
             </a:r>
           </a:p>
           <a:p>
@@ -14120,15 +14162,7 @@
             </a:pPr>
             <a:r>
               <a:rPr lang="en-US" dirty="0"/>
-              <a:t>This means we have an opportunity to create a simple interface in the spirit of </a:t>
-            </a:r>
-            <a:r>
-              <a:rPr lang="en-US" dirty="0" err="1"/>
-              <a:t>Tables.jl</a:t>
-            </a:r>
-            <a:r>
-              <a:rPr lang="en-US" dirty="0"/>
-              <a:t> for causal ML</a:t>
+              <a:t>Beta is learned during training via least squares optimization by multiplying the pseudoinverse of H with Y</a:t>
             </a:r>
           </a:p>
           <a:p>
@@ -14138,13 +14172,8 @@
             </a:pPr>
             <a:r>
               <a:rPr lang="en-US" dirty="0"/>
-              <a:t>Then anyone can easily estimate causal effects using a simple workflow like the one used by </a:t>
-            </a:r>
-            <a:r>
-              <a:rPr lang="en-US" dirty="0" err="1"/>
-              <a:t>CausalELM</a:t>
-            </a:r>
-            <a:endParaRPr lang="en-US" dirty="0"/>
+              <a:t>And H can be thought of as a hidden layer that is the result of multiplying the training inputs by some weights and applying an activation function</a:t>
+            </a:r>
           </a:p>
           <a:p>
             <a:pPr marL="171450" indent="-171450">
@@ -14153,7 +14182,7 @@
             </a:pPr>
             <a:r>
               <a:rPr lang="en-US" dirty="0"/>
-              <a:t>Could also take this even further and make a metapackage like MLJ</a:t>
+              <a:t>Unlike a typical neural network, the weights are drawn from a uniform distribution and never change</a:t>
             </a:r>
           </a:p>
         </p:txBody>
@@ -14197,7 +14226,173 @@
           <a:p>
             <a:fld id="{8145AEA4-9AF0-4C4A-BC4B-23D78442E029}" type="slidenum">
               <a:rPr lang="en-US" smtClean="0"/>
-              <a:t>22</a:t>
+              <a:t>20</a:t>
+            </a:fld>
+            <a:endParaRPr lang="en-US"/>
+          </a:p>
+        </p:txBody>
+      </p:sp>
+    </p:spTree>
+    <p:extLst>
+      <p:ext uri="{BB962C8B-B14F-4D97-AF65-F5344CB8AC3E}">
+        <p14:creationId xmlns:p14="http://schemas.microsoft.com/office/powerpoint/2010/main" val="374549233"/>
+      </p:ext>
+    </p:extLst>
+  </p:cSld>
+  <p:clrMapOvr>
+    <a:masterClrMapping/>
+  </p:clrMapOvr>
+</p:notes>
+</file>
+
+<file path=ppt/notesSlides/notesSlide12.xml><?xml version="1.0" encoding="utf-8"?>
+<p:notes xmlns:a="http://schemas.openxmlformats.org/drawingml/2006/main" xmlns:r="http://schemas.openxmlformats.org/officeDocument/2006/relationships" xmlns:p="http://schemas.openxmlformats.org/presentationml/2006/main">
+  <p:cSld>
+    <p:spTree>
+      <p:nvGrpSpPr>
+        <p:cNvPr id="1" name=""/>
+        <p:cNvGrpSpPr/>
+        <p:nvPr/>
+      </p:nvGrpSpPr>
+      <p:grpSpPr>
+        <a:xfrm>
+          <a:off x="0" y="0"/>
+          <a:ext cx="0" cy="0"/>
+          <a:chOff x="0" y="0"/>
+          <a:chExt cx="0" cy="0"/>
+        </a:xfrm>
+      </p:grpSpPr>
+      <p:sp>
+        <p:nvSpPr>
+          <p:cNvPr id="2" name="Slide Image Placeholder 1"/>
+          <p:cNvSpPr>
+            <a:spLocks noGrp="1" noRot="1" noChangeAspect="1"/>
+          </p:cNvSpPr>
+          <p:nvPr>
+            <p:ph type="sldImg"/>
+          </p:nvPr>
+        </p:nvSpPr>
+        <p:spPr/>
+      </p:sp>
+      <p:sp>
+        <p:nvSpPr>
+          <p:cNvPr id="3" name="Notes Placeholder 2"/>
+          <p:cNvSpPr>
+            <a:spLocks noGrp="1"/>
+          </p:cNvSpPr>
+          <p:nvPr>
+            <p:ph type="body" idx="1"/>
+          </p:nvPr>
+        </p:nvSpPr>
+        <p:spPr/>
+        <p:txBody>
+          <a:bodyPr/>
+          <a:lstStyle/>
+          <a:p>
+            <a:pPr marL="171450" indent="-171450">
+              <a:buFontTx/>
+              <a:buChar char="-"/>
+            </a:pPr>
+            <a:r>
+              <a:rPr lang="en-US" dirty="0"/>
+              <a:t>Hopefully somebody in the room gets the Stepbrothers reference</a:t>
+            </a:r>
+          </a:p>
+          <a:p>
+            <a:pPr marL="171450" indent="-171450">
+              <a:buFontTx/>
+              <a:buChar char="-"/>
+            </a:pPr>
+            <a:r>
+              <a:rPr lang="en-US" dirty="0"/>
+              <a:t>In Julia there isn’t a highly developed ecosystem for causal ML like in Python</a:t>
+            </a:r>
+          </a:p>
+          <a:p>
+            <a:pPr marL="171450" indent="-171450">
+              <a:buFontTx/>
+              <a:buChar char="-"/>
+            </a:pPr>
+            <a:r>
+              <a:rPr lang="en-US" dirty="0"/>
+              <a:t>This means we have an opportunity to create a simple interface in the spirit of </a:t>
+            </a:r>
+            <a:r>
+              <a:rPr lang="en-US" dirty="0" err="1"/>
+              <a:t>Tables.jl</a:t>
+            </a:r>
+            <a:r>
+              <a:rPr lang="en-US" dirty="0"/>
+              <a:t> for causal ML</a:t>
+            </a:r>
+          </a:p>
+          <a:p>
+            <a:pPr marL="171450" indent="-171450">
+              <a:buFontTx/>
+              <a:buChar char="-"/>
+            </a:pPr>
+            <a:r>
+              <a:rPr lang="en-US" dirty="0"/>
+              <a:t>Then anyone can easily estimate causal effects using a simple workflow like the one used by </a:t>
+            </a:r>
+            <a:r>
+              <a:rPr lang="en-US" dirty="0" err="1"/>
+              <a:t>CausalELM</a:t>
+            </a:r>
+            <a:endParaRPr lang="en-US" dirty="0"/>
+          </a:p>
+          <a:p>
+            <a:pPr marL="171450" indent="-171450">
+              <a:buFontTx/>
+              <a:buChar char="-"/>
+            </a:pPr>
+            <a:r>
+              <a:rPr lang="en-US" dirty="0"/>
+              <a:t>Could also take this even further and make a metapackage like MLJ</a:t>
+            </a:r>
+          </a:p>
+        </p:txBody>
+      </p:sp>
+      <p:sp>
+        <p:nvSpPr>
+          <p:cNvPr id="4" name="Footer Placeholder 3"/>
+          <p:cNvSpPr>
+            <a:spLocks noGrp="1"/>
+          </p:cNvSpPr>
+          <p:nvPr>
+            <p:ph type="ftr" sz="quarter" idx="4"/>
+          </p:nvPr>
+        </p:nvSpPr>
+        <p:spPr/>
+        <p:txBody>
+          <a:bodyPr/>
+          <a:lstStyle/>
+          <a:p>
+            <a:r>
+              <a:rPr lang="en-US"/>
+              <a:t>JuliaCon 2024</a:t>
+            </a:r>
+          </a:p>
+        </p:txBody>
+      </p:sp>
+      <p:sp>
+        <p:nvSpPr>
+          <p:cNvPr id="5" name="Slide Number Placeholder 4"/>
+          <p:cNvSpPr>
+            <a:spLocks noGrp="1"/>
+          </p:cNvSpPr>
+          <p:nvPr>
+            <p:ph type="sldNum" sz="quarter" idx="5"/>
+          </p:nvPr>
+        </p:nvSpPr>
+        <p:spPr/>
+        <p:txBody>
+          <a:bodyPr/>
+          <a:lstStyle/>
+          <a:p>
+            <a:fld id="{8145AEA4-9AF0-4C4A-BC4B-23D78442E029}" type="slidenum">
+              <a:rPr lang="en-US" smtClean="0"/>
+              <a:t>23</a:t>
             </a:fld>
             <a:endParaRPr lang="en-US"/>
           </a:p>
@@ -15771,7 +15966,7 @@
           <a:p>
             <a:fld id="{C4E7D1CE-7D1F-4A03-B67E-08DE021841F5}" type="datetime1">
               <a:rPr lang="en-US" smtClean="0"/>
-              <a:t>7/6/2024</a:t>
+              <a:t>7/8/2024</a:t>
             </a:fld>
             <a:endParaRPr lang="en-US" dirty="0"/>
           </a:p>
@@ -16859,7 +17054,7 @@
           <a:p>
             <a:fld id="{213669F5-F063-415B-9DFB-EB4B1BB84AA1}" type="datetime1">
               <a:rPr lang="en-US" smtClean="0"/>
-              <a:t>7/6/2024</a:t>
+              <a:t>7/8/2024</a:t>
             </a:fld>
             <a:endParaRPr lang="en-US" dirty="0"/>
           </a:p>
@@ -17839,7 +18034,7 @@
           <a:p>
             <a:fld id="{DEC1886C-811B-464C-B640-FB8045538D7A}" type="datetime1">
               <a:rPr lang="en-US" smtClean="0"/>
-              <a:t>7/6/2024</a:t>
+              <a:t>7/8/2024</a:t>
             </a:fld>
             <a:endParaRPr lang="en-US" dirty="0"/>
           </a:p>
@@ -18973,7 +19168,7 @@
           <a:p>
             <a:fld id="{5D2F8C89-AFF9-4E87-9EF2-5B7C93B91BA5}" type="datetime1">
               <a:rPr lang="en-US" smtClean="0"/>
-              <a:t>7/6/2024</a:t>
+              <a:t>7/8/2024</a:t>
             </a:fld>
             <a:endParaRPr lang="en-US" dirty="0"/>
           </a:p>
@@ -20006,7 +20201,7 @@
           <a:p>
             <a:fld id="{6F947C2E-3C18-4364-A3B1-6D0CCD2FC01D}" type="datetime1">
               <a:rPr lang="en-US" smtClean="0"/>
-              <a:t>7/6/2024</a:t>
+              <a:t>7/8/2024</a:t>
             </a:fld>
             <a:endParaRPr lang="en-US" dirty="0"/>
           </a:p>
@@ -20666,7 +20861,7 @@
           <a:p>
             <a:fld id="{F88688E7-DB2B-4B5D-8004-F7575F7C2351}" type="datetime1">
               <a:rPr lang="en-US" smtClean="0"/>
-              <a:t>7/6/2024</a:t>
+              <a:t>7/8/2024</a:t>
             </a:fld>
             <a:endParaRPr lang="en-US" dirty="0"/>
           </a:p>
@@ -21527,7 +21722,7 @@
           <a:p>
             <a:fld id="{EAFC4BBC-72D6-4D14-ACDD-22379EFBF8BC}" type="datetime1">
               <a:rPr lang="en-US" smtClean="0"/>
-              <a:t>7/6/2024</a:t>
+              <a:t>7/8/2024</a:t>
             </a:fld>
             <a:endParaRPr lang="en-US" dirty="0"/>
           </a:p>
@@ -21717,7 +21912,7 @@
           <a:p>
             <a:fld id="{46A4EA2F-D415-49AC-BBC0-9A3B96F809F6}" type="datetime1">
               <a:rPr lang="en-US" smtClean="0"/>
-              <a:t>7/6/2024</a:t>
+              <a:t>7/8/2024</a:t>
             </a:fld>
             <a:endParaRPr lang="en-US" dirty="0"/>
           </a:p>
@@ -22689,7 +22884,7 @@
           <a:p>
             <a:fld id="{87EEEEC8-BD77-404A-BDA3-DDBDAB3F47A2}" type="datetime1">
               <a:rPr lang="en-US" smtClean="0"/>
-              <a:t>7/6/2024</a:t>
+              <a:t>7/8/2024</a:t>
             </a:fld>
             <a:endParaRPr lang="en-US" dirty="0"/>
           </a:p>
@@ -22900,7 +23095,7 @@
           <a:p>
             <a:fld id="{048C1CC1-B277-46D0-ADF8-0B7018EA1494}" type="datetime1">
               <a:rPr lang="en-US" smtClean="0"/>
-              <a:t>7/6/2024</a:t>
+              <a:t>7/8/2024</a:t>
             </a:fld>
             <a:endParaRPr lang="en-US" dirty="0"/>
           </a:p>
@@ -23934,7 +24129,7 @@
           <a:p>
             <a:fld id="{3DA36211-FA49-482B-AFBD-DC01FA2C8C8C}" type="datetime1">
               <a:rPr lang="en-US" smtClean="0"/>
-              <a:t>7/6/2024</a:t>
+              <a:t>7/8/2024</a:t>
             </a:fld>
             <a:endParaRPr lang="en-US" dirty="0"/>
           </a:p>
@@ -24206,7 +24401,7 @@
           <a:p>
             <a:fld id="{044EF46F-2254-4027-BE6B-B3203F75B424}" type="datetime1">
               <a:rPr lang="en-US" smtClean="0"/>
-              <a:t>7/6/2024</a:t>
+              <a:t>7/8/2024</a:t>
             </a:fld>
             <a:endParaRPr lang="en-US" dirty="0"/>
           </a:p>
@@ -24616,7 +24811,7 @@
           <a:p>
             <a:fld id="{DB292544-8C1C-442E-A285-3F7DCD4A5657}" type="datetime1">
               <a:rPr lang="en-US" smtClean="0"/>
-              <a:t>7/6/2024</a:t>
+              <a:t>7/8/2024</a:t>
             </a:fld>
             <a:endParaRPr lang="en-US" dirty="0"/>
           </a:p>
@@ -24743,7 +24938,7 @@
           <a:p>
             <a:fld id="{115F366F-7844-4C6C-B8DB-6BC40CF29193}" type="datetime1">
               <a:rPr lang="en-US" smtClean="0"/>
-              <a:t>7/6/2024</a:t>
+              <a:t>7/8/2024</a:t>
             </a:fld>
             <a:endParaRPr lang="en-US" dirty="0"/>
           </a:p>
@@ -24838,7 +25033,7 @@
           <a:p>
             <a:fld id="{1AB00586-7DA3-4126-AD2F-A469D67B65ED}" type="datetime1">
               <a:rPr lang="en-US" smtClean="0"/>
-              <a:t>7/6/2024</a:t>
+              <a:t>7/8/2024</a:t>
             </a:fld>
             <a:endParaRPr lang="en-US" dirty="0"/>
           </a:p>
@@ -25919,7 +26114,7 @@
           <a:p>
             <a:fld id="{2EF2911A-F7B5-46BD-89D1-32B9F9BBDD6F}" type="datetime1">
               <a:rPr lang="en-US" smtClean="0"/>
-              <a:t>7/6/2024</a:t>
+              <a:t>7/8/2024</a:t>
             </a:fld>
             <a:endParaRPr lang="en-US" dirty="0"/>
           </a:p>
@@ -27027,7 +27222,7 @@
           <a:p>
             <a:fld id="{2247D990-51D8-40B7-8DCE-967C54B7CA1F}" type="datetime1">
               <a:rPr lang="en-US" smtClean="0"/>
-              <a:t>7/6/2024</a:t>
+              <a:t>7/8/2024</a:t>
             </a:fld>
             <a:endParaRPr lang="en-US" dirty="0"/>
           </a:p>
@@ -28024,7 +28219,7 @@
           <a:p>
             <a:fld id="{6EF72961-FB66-41C5-8068-B5C60952F5E0}" type="datetime1">
               <a:rPr lang="en-US" smtClean="0"/>
-              <a:t>7/6/2024</a:t>
+              <a:t>7/8/2024</a:t>
             </a:fld>
             <a:endParaRPr lang="en-US" dirty="0"/>
           </a:p>
@@ -31796,7 +31991,7 @@
         </p:spPr>
         <p:txBody>
           <a:bodyPr anchor="ctr">
-            <a:normAutofit fontScale="77500" lnSpcReduction="20000"/>
+            <a:normAutofit fontScale="85000" lnSpcReduction="10000"/>
           </a:bodyPr>
           <a:lstStyle/>
           <a:p>
@@ -31854,42 +32049,250 @@
           <a:p>
             <a:pPr lvl="1"/>
             <a:r>
+              <a:rPr lang="en-US" sz="3100" b="1" dirty="0" err="1">
+                <a:solidFill>
+                  <a:schemeClr val="tx1"/>
+                </a:solidFill>
+              </a:rPr>
+              <a:t>W</a:t>
+            </a:r>
+            <a:r>
+              <a:rPr lang="en-US" sz="3100" b="1" baseline="-25000" dirty="0" err="1">
+                <a:solidFill>
+                  <a:schemeClr val="tx1"/>
+                </a:solidFill>
+              </a:rPr>
+              <a:t>feats</a:t>
+            </a:r>
+            <a:r>
+              <a:rPr lang="en-US" sz="3100" b="1" baseline="-25000" dirty="0">
+                <a:solidFill>
+                  <a:schemeClr val="tx1"/>
+                </a:solidFill>
+              </a:rPr>
+              <a:t>, neurons</a:t>
+            </a:r>
+            <a:r>
+              <a:rPr lang="en-US" sz="3100" b="1" dirty="0">
+                <a:solidFill>
+                  <a:schemeClr val="tx1"/>
+                </a:solidFill>
+              </a:rPr>
+              <a:t> </a:t>
+            </a:r>
+            <a:r>
               <a:rPr lang="en-US" sz="3100" dirty="0">
                 <a:solidFill>
                   <a:schemeClr val="tx1"/>
                 </a:solidFill>
               </a:rPr>
-              <a:t>Simple single layer neural network</a:t>
-            </a:r>
+              <a:t>~ U(-1, 1)</a:t>
+            </a:r>
+            <a:endParaRPr lang="en-US" sz="3100" b="1" dirty="0">
+              <a:solidFill>
+                <a:schemeClr val="tx1"/>
+              </a:solidFill>
+            </a:endParaRPr>
           </a:p>
           <a:p>
             <a:pPr lvl="1"/>
+            <a:r>
+              <a:rPr lang="en-US" sz="3100" b="1" dirty="0">
+                <a:solidFill>
+                  <a:schemeClr val="tx1"/>
+                </a:solidFill>
+              </a:rPr>
+              <a:t>H </a:t>
+            </a:r>
             <a:r>
               <a:rPr lang="en-US" sz="3100" dirty="0">
                 <a:solidFill>
                   <a:schemeClr val="tx1"/>
                 </a:solidFill>
               </a:rPr>
-              <a:t>Uses random weights to solve least squares problem</a:t>
-            </a:r>
-          </a:p>
-          <a:p>
-            <a:r>
-              <a:rPr lang="en-US" sz="3500" dirty="0" err="1">
+              <a:t>=</a:t>
+            </a:r>
+            <a:r>
+              <a:rPr lang="en-US" sz="3100" b="1" dirty="0">
                 <a:solidFill>
                   <a:schemeClr val="tx1"/>
                 </a:solidFill>
               </a:rPr>
-              <a:t>CausalELM</a:t>
-            </a:r>
-            <a:r>
-              <a:rPr lang="en-US" sz="3500" dirty="0">
+              <a:t> </a:t>
+            </a:r>
+            <a:r>
+              <a:rPr lang="en-US" sz="3100" dirty="0">
                 <a:solidFill>
                   <a:schemeClr val="tx1"/>
                 </a:solidFill>
               </a:rPr>
-              <a:t> uses bagged ensembles of them</a:t>
-            </a:r>
+              <a:t>g(</a:t>
+            </a:r>
+            <a:r>
+              <a:rPr lang="en-US" sz="3100" b="1" dirty="0">
+                <a:solidFill>
+                  <a:schemeClr val="tx1"/>
+                </a:solidFill>
+              </a:rPr>
+              <a:t>XW</a:t>
+            </a:r>
+            <a:r>
+              <a:rPr lang="en-US" sz="3100" baseline="30000" dirty="0">
+                <a:solidFill>
+                  <a:schemeClr val="tx1"/>
+                </a:solidFill>
+              </a:rPr>
+              <a:t>T</a:t>
+            </a:r>
+            <a:r>
+              <a:rPr lang="en-US" sz="3100" dirty="0">
+                <a:solidFill>
+                  <a:schemeClr val="tx1"/>
+                </a:solidFill>
+              </a:rPr>
+              <a:t>)</a:t>
+            </a:r>
+            <a:endParaRPr lang="en-US" sz="3100" b="1" dirty="0">
+              <a:solidFill>
+                <a:schemeClr val="tx1"/>
+              </a:solidFill>
+            </a:endParaRPr>
+          </a:p>
+          <a:p>
+            <a:pPr lvl="1"/>
+            <a:r>
+              <a:rPr lang="el-GR" sz="3100" b="1" dirty="0">
+                <a:solidFill>
+                  <a:schemeClr val="tx1"/>
+                </a:solidFill>
+              </a:rPr>
+              <a:t>β</a:t>
+            </a:r>
+            <a:r>
+              <a:rPr lang="en-US" sz="3100" dirty="0">
+                <a:solidFill>
+                  <a:schemeClr val="tx1"/>
+                </a:solidFill>
+              </a:rPr>
+              <a:t> = </a:t>
+            </a:r>
+            <a:r>
+              <a:rPr lang="en-US" sz="3100" b="1" dirty="0">
+                <a:solidFill>
+                  <a:schemeClr val="tx1"/>
+                </a:solidFill>
+              </a:rPr>
+              <a:t>H</a:t>
+            </a:r>
+            <a:r>
+              <a:rPr lang="en-US" sz="3100" baseline="30000" dirty="0">
+                <a:solidFill>
+                  <a:schemeClr val="tx1"/>
+                </a:solidFill>
+              </a:rPr>
+              <a:t>+</a:t>
+            </a:r>
+            <a:r>
+              <a:rPr lang="en-US" sz="3100" b="1" dirty="0">
+                <a:solidFill>
+                  <a:schemeClr val="tx1"/>
+                </a:solidFill>
+              </a:rPr>
+              <a:t>Y</a:t>
+            </a:r>
+            <a:endParaRPr lang="en-US" sz="3100" dirty="0">
+              <a:solidFill>
+                <a:schemeClr val="tx1"/>
+              </a:solidFill>
+            </a:endParaRPr>
+          </a:p>
+          <a:p>
+            <a:pPr lvl="1"/>
+            <a:r>
+              <a:rPr lang="en-US" sz="3100" dirty="0">
+                <a:solidFill>
+                  <a:schemeClr val="tx1"/>
+                </a:solidFill>
+              </a:rPr>
+              <a:t>f(</a:t>
+            </a:r>
+            <a:r>
+              <a:rPr lang="en-US" sz="3100" b="1" dirty="0" err="1">
+                <a:solidFill>
+                  <a:schemeClr val="tx1"/>
+                </a:solidFill>
+              </a:rPr>
+              <a:t>X</a:t>
+            </a:r>
+            <a:r>
+              <a:rPr lang="en-US" sz="3100" baseline="-25000" dirty="0" err="1">
+                <a:solidFill>
+                  <a:schemeClr val="tx1"/>
+                </a:solidFill>
+              </a:rPr>
+              <a:t>Test</a:t>
+            </a:r>
+            <a:r>
+              <a:rPr lang="en-US" sz="3100" dirty="0">
+                <a:solidFill>
+                  <a:schemeClr val="tx1"/>
+                </a:solidFill>
+              </a:rPr>
+              <a:t>) = g(</a:t>
+            </a:r>
+            <a:r>
+              <a:rPr lang="en-US" sz="3100" b="1" dirty="0" err="1">
+                <a:solidFill>
+                  <a:schemeClr val="tx1"/>
+                </a:solidFill>
+              </a:rPr>
+              <a:t>X</a:t>
+            </a:r>
+            <a:r>
+              <a:rPr lang="en-US" sz="3100" baseline="-25000" dirty="0" err="1">
+                <a:solidFill>
+                  <a:schemeClr val="tx1"/>
+                </a:solidFill>
+              </a:rPr>
+              <a:t>Test</a:t>
+            </a:r>
+            <a:r>
+              <a:rPr lang="en-US" sz="3100" b="1" dirty="0" err="1">
+                <a:solidFill>
+                  <a:schemeClr val="tx1"/>
+                </a:solidFill>
+              </a:rPr>
+              <a:t>W</a:t>
+            </a:r>
+            <a:r>
+              <a:rPr lang="en-US" sz="3100" baseline="30000" dirty="0" err="1">
+                <a:solidFill>
+                  <a:schemeClr val="tx1"/>
+                </a:solidFill>
+              </a:rPr>
+              <a:t>T</a:t>
+            </a:r>
+            <a:r>
+              <a:rPr lang="en-US" sz="3100" dirty="0">
+                <a:solidFill>
+                  <a:schemeClr val="tx1"/>
+                </a:solidFill>
+              </a:rPr>
+              <a:t>)</a:t>
+            </a:r>
+            <a:r>
+              <a:rPr lang="el-GR" sz="3100" b="1" dirty="0">
+                <a:solidFill>
+                  <a:schemeClr val="tx1"/>
+                </a:solidFill>
+              </a:rPr>
+              <a:t>β</a:t>
+            </a:r>
+            <a:endParaRPr lang="en-US" sz="3100" b="1" dirty="0">
+              <a:solidFill>
+                <a:schemeClr val="tx1"/>
+              </a:solidFill>
+            </a:endParaRPr>
           </a:p>
         </p:txBody>
       </p:sp>
@@ -31996,41 +32399,6 @@
                 <a:srgbClr val="FFFFFF"/>
               </a:solidFill>
             </a:endParaRPr>
-          </a:p>
-        </p:txBody>
-      </p:sp>
-      <p:sp>
-        <p:nvSpPr>
-          <p:cNvPr id="6" name="TextBox 5">
-            <a:extLst>
-              <a:ext uri="{FF2B5EF4-FFF2-40B4-BE49-F238E27FC236}">
-                <a16:creationId xmlns:a16="http://schemas.microsoft.com/office/drawing/2014/main" id="{F0E4A55B-3A27-EA08-FA48-4307CE974D23}"/>
-              </a:ext>
-            </a:extLst>
-          </p:cNvPr>
-          <p:cNvSpPr txBox="1"/>
-          <p:nvPr/>
-        </p:nvSpPr>
-        <p:spPr>
-          <a:xfrm>
-            <a:off x="478632" y="5959155"/>
-            <a:ext cx="8465737" cy="369332"/>
-          </a:xfrm>
-          <a:prstGeom prst="rect">
-            <a:avLst/>
-          </a:prstGeom>
-          <a:noFill/>
-        </p:spPr>
-        <p:txBody>
-          <a:bodyPr wrap="square" rtlCol="0">
-            <a:spAutoFit/>
-          </a:bodyPr>
-          <a:lstStyle/>
-          <a:p>
-            <a:r>
-              <a:rPr lang="en-US" dirty="0"/>
-              <a:t>*If the estimated effects seem way off, try a different activation function</a:t>
-            </a:r>
           </a:p>
         </p:txBody>
       </p:sp>
@@ -32734,6 +33102,677 @@
     <p:bg>
       <p:bgPr>
         <a:solidFill>
+          <a:schemeClr val="bg1"/>
+        </a:solidFill>
+        <a:effectLst/>
+      </p:bgPr>
+    </p:bg>
+    <p:spTree>
+      <p:nvGrpSpPr>
+        <p:cNvPr id="1" name=""/>
+        <p:cNvGrpSpPr/>
+        <p:nvPr/>
+      </p:nvGrpSpPr>
+      <p:grpSpPr>
+        <a:xfrm>
+          <a:off x="0" y="0"/>
+          <a:ext cx="0" cy="0"/>
+          <a:chOff x="0" y="0"/>
+          <a:chExt cx="0" cy="0"/>
+        </a:xfrm>
+      </p:grpSpPr>
+      <p:sp useBgFill="1">
+        <p:nvSpPr>
+          <p:cNvPr id="10" name="Rectangle 9">
+            <a:extLst>
+              <a:ext uri="{FF2B5EF4-FFF2-40B4-BE49-F238E27FC236}">
+                <a16:creationId xmlns:a16="http://schemas.microsoft.com/office/drawing/2014/main" id="{B219AE65-9B94-44EA-BEF3-EF4BFA169C81}"/>
+              </a:ext>
+              <a:ext uri="{C183D7F6-B498-43B3-948B-1728B52AA6E4}">
+                <adec:decorative xmlns:adec="http://schemas.microsoft.com/office/drawing/2017/decorative" val="1"/>
+              </a:ext>
+            </a:extLst>
+          </p:cNvPr>
+          <p:cNvSpPr>
+            <a:spLocks noGrp="1" noRot="1" noChangeAspect="1" noMove="1" noResize="1" noEditPoints="1" noAdjustHandles="1" noChangeArrowheads="1" noChangeShapeType="1" noTextEdit="1"/>
+          </p:cNvSpPr>
+          <p:nvPr>
+            <p:extLst>
+              <p:ext uri="{386F3935-93C4-4BCD-93E2-E3B085C9AB24}">
+                <p16:designElem xmlns:p16="http://schemas.microsoft.com/office/powerpoint/2015/main" val="1"/>
+              </p:ext>
+            </p:extLst>
+          </p:nvPr>
+        </p:nvSpPr>
+        <p:spPr>
+          <a:xfrm>
+            <a:off x="0" y="0"/>
+            <a:ext cx="12192000" cy="6858000"/>
+          </a:xfrm>
+          <a:prstGeom prst="rect">
+            <a:avLst/>
+          </a:prstGeom>
+          <a:ln>
+            <a:noFill/>
+          </a:ln>
+        </p:spPr>
+        <p:style>
+          <a:lnRef idx="2">
+            <a:schemeClr val="accent1">
+              <a:shade val="50000"/>
+            </a:schemeClr>
+          </a:lnRef>
+          <a:fillRef idx="1">
+            <a:schemeClr val="accent1"/>
+          </a:fillRef>
+          <a:effectRef idx="0">
+            <a:schemeClr val="accent1"/>
+          </a:effectRef>
+          <a:fontRef idx="minor">
+            <a:schemeClr val="lt1"/>
+          </a:fontRef>
+        </p:style>
+        <p:txBody>
+          <a:bodyPr rtlCol="0" anchor="ctr"/>
+          <a:lstStyle/>
+          <a:p>
+            <a:pPr algn="ctr"/>
+            <a:endParaRPr lang="en-US"/>
+          </a:p>
+        </p:txBody>
+      </p:sp>
+      <p:sp>
+        <p:nvSpPr>
+          <p:cNvPr id="12" name="Rectangle 11">
+            <a:extLst>
+              <a:ext uri="{FF2B5EF4-FFF2-40B4-BE49-F238E27FC236}">
+                <a16:creationId xmlns:a16="http://schemas.microsoft.com/office/drawing/2014/main" id="{F0C81A57-9CD5-461B-8FFE-4A8CB6CFBE01}"/>
+              </a:ext>
+              <a:ext uri="{C183D7F6-B498-43B3-948B-1728B52AA6E4}">
+                <adec:decorative xmlns:adec="http://schemas.microsoft.com/office/drawing/2017/decorative" val="1"/>
+              </a:ext>
+            </a:extLst>
+          </p:cNvPr>
+          <p:cNvSpPr>
+            <a:spLocks noGrp="1" noRot="1" noChangeAspect="1" noMove="1" noResize="1" noEditPoints="1" noAdjustHandles="1" noChangeArrowheads="1" noChangeShapeType="1" noTextEdit="1"/>
+          </p:cNvSpPr>
+          <p:nvPr>
+            <p:extLst>
+              <p:ext uri="{386F3935-93C4-4BCD-93E2-E3B085C9AB24}">
+                <p16:designElem xmlns:p16="http://schemas.microsoft.com/office/powerpoint/2015/main" val="1"/>
+              </p:ext>
+            </p:extLst>
+          </p:nvPr>
+        </p:nvSpPr>
+        <p:spPr>
+          <a:xfrm>
+            <a:off x="11017539" y="467397"/>
+            <a:ext cx="695829" cy="5919116"/>
+          </a:xfrm>
+          <a:prstGeom prst="rect">
+            <a:avLst/>
+          </a:prstGeom>
+          <a:solidFill>
+            <a:schemeClr val="accent1"/>
+          </a:solidFill>
+          <a:ln>
+            <a:noFill/>
+          </a:ln>
+          <a:effectLst/>
+        </p:spPr>
+        <p:style>
+          <a:lnRef idx="1">
+            <a:schemeClr val="accent1"/>
+          </a:lnRef>
+          <a:fillRef idx="3">
+            <a:schemeClr val="accent1"/>
+          </a:fillRef>
+          <a:effectRef idx="2">
+            <a:schemeClr val="accent1"/>
+          </a:effectRef>
+          <a:fontRef idx="minor">
+            <a:schemeClr val="lt1"/>
+          </a:fontRef>
+        </p:style>
+        <p:txBody>
+          <a:bodyPr/>
+          <a:lstStyle/>
+          <a:p>
+            <a:endParaRPr lang="en-US"/>
+          </a:p>
+        </p:txBody>
+      </p:sp>
+      <p:grpSp>
+        <p:nvGrpSpPr>
+          <p:cNvPr id="14" name="Group 13">
+            <a:extLst>
+              <a:ext uri="{FF2B5EF4-FFF2-40B4-BE49-F238E27FC236}">
+                <a16:creationId xmlns:a16="http://schemas.microsoft.com/office/drawing/2014/main" id="{3086C462-37F4-494D-8292-CCB95221CC1A}"/>
+              </a:ext>
+              <a:ext uri="{C183D7F6-B498-43B3-948B-1728B52AA6E4}">
+                <adec:decorative xmlns:adec="http://schemas.microsoft.com/office/drawing/2017/decorative" val="1"/>
+              </a:ext>
+            </a:extLst>
+          </p:cNvPr>
+          <p:cNvGrpSpPr>
+            <a:grpSpLocks noGrp="1" noUngrp="1" noRot="1" noChangeAspect="1" noMove="1" noResize="1"/>
+          </p:cNvGrpSpPr>
+          <p:nvPr>
+            <p:extLst>
+              <p:ext uri="{386F3935-93C4-4BCD-93E2-E3B085C9AB24}">
+                <p16:designElem xmlns:p16="http://schemas.microsoft.com/office/powerpoint/2015/main" val="1"/>
+              </p:ext>
+            </p:extLst>
+          </p:nvPr>
+        </p:nvGrpSpPr>
+        <p:grpSpPr>
+          <a:xfrm>
+            <a:off x="0" y="0"/>
+            <a:ext cx="12192000" cy="6858000"/>
+            <a:chOff x="0" y="0"/>
+            <a:chExt cx="12192000" cy="6858000"/>
+          </a:xfrm>
+          <a:solidFill>
+            <a:srgbClr val="FFFFFF"/>
+          </a:solidFill>
+        </p:grpSpPr>
+        <p:sp>
+          <p:nvSpPr>
+            <p:cNvPr id="15" name="Rectangle 14">
+              <a:extLst>
+                <a:ext uri="{FF2B5EF4-FFF2-40B4-BE49-F238E27FC236}">
+                  <a16:creationId xmlns:a16="http://schemas.microsoft.com/office/drawing/2014/main" id="{2C7D2D64-353F-4802-AA48-A70CE6020B93}"/>
+                </a:ext>
+                <a:ext uri="{C183D7F6-B498-43B3-948B-1728B52AA6E4}">
+                  <adec:decorative xmlns:adec="http://schemas.microsoft.com/office/drawing/2017/decorative" val="1"/>
+                </a:ext>
+              </a:extLst>
+            </p:cNvPr>
+            <p:cNvSpPr/>
+            <p:nvPr>
+              <p:extLst>
+                <p:ext uri="{386F3935-93C4-4BCD-93E2-E3B085C9AB24}">
+                  <p16:designElem xmlns:p16="http://schemas.microsoft.com/office/powerpoint/2015/main" val="1"/>
+                </p:ext>
+              </p:extLst>
+            </p:nvPr>
+          </p:nvSpPr>
+          <p:spPr>
+            <a:xfrm>
+              <a:off x="0" y="0"/>
+              <a:ext cx="12192000" cy="6858000"/>
+            </a:xfrm>
+            <a:prstGeom prst="rect">
+              <a:avLst/>
+            </a:prstGeom>
+            <a:noFill/>
+            <a:ln>
+              <a:noFill/>
+            </a:ln>
+          </p:spPr>
+          <p:style>
+            <a:lnRef idx="2">
+              <a:schemeClr val="accent1">
+                <a:shade val="50000"/>
+              </a:schemeClr>
+            </a:lnRef>
+            <a:fillRef idx="1">
+              <a:schemeClr val="accent1"/>
+            </a:fillRef>
+            <a:effectRef idx="0">
+              <a:schemeClr val="accent1"/>
+            </a:effectRef>
+            <a:fontRef idx="minor">
+              <a:schemeClr val="lt1"/>
+            </a:fontRef>
+          </p:style>
+          <p:txBody>
+            <a:bodyPr/>
+            <a:lstStyle/>
+            <a:p>
+              <a:endParaRPr lang="en-US"/>
+            </a:p>
+          </p:txBody>
+        </p:sp>
+        <p:sp>
+          <p:nvSpPr>
+            <p:cNvPr id="16" name="Freeform 5">
+              <a:extLst>
+                <a:ext uri="{FF2B5EF4-FFF2-40B4-BE49-F238E27FC236}">
+                  <a16:creationId xmlns:a16="http://schemas.microsoft.com/office/drawing/2014/main" id="{30A6328F-CAA3-4052-BF4C-14BD47706E65}"/>
+                </a:ext>
+                <a:ext uri="{C183D7F6-B498-43B3-948B-1728B52AA6E4}">
+                  <adec:decorative xmlns:adec="http://schemas.microsoft.com/office/drawing/2017/decorative" val="1"/>
+                </a:ext>
+              </a:extLst>
+            </p:cNvPr>
+            <p:cNvSpPr>
+              <a:spLocks noEditPoints="1"/>
+            </p:cNvSpPr>
+            <p:nvPr>
+              <p:extLst>
+                <p:ext uri="{386F3935-93C4-4BCD-93E2-E3B085C9AB24}">
+                  <p16:designElem xmlns:p16="http://schemas.microsoft.com/office/powerpoint/2015/main" val="1"/>
+                </p:ext>
+              </p:extLst>
+            </p:nvPr>
+          </p:nvSpPr>
+          <p:spPr bwMode="gray">
+            <a:xfrm>
+              <a:off x="0" y="1587"/>
+              <a:ext cx="12192000" cy="6856413"/>
+            </a:xfrm>
+            <a:custGeom>
+              <a:avLst/>
+              <a:gdLst/>
+              <a:ahLst/>
+              <a:cxnLst/>
+              <a:rect l="0" t="0" r="r" b="b"/>
+              <a:pathLst>
+                <a:path w="15356" h="8638">
+                  <a:moveTo>
+                    <a:pt x="0" y="0"/>
+                  </a:moveTo>
+                  <a:lnTo>
+                    <a:pt x="0" y="8638"/>
+                  </a:lnTo>
+                  <a:lnTo>
+                    <a:pt x="15356" y="8638"/>
+                  </a:lnTo>
+                  <a:lnTo>
+                    <a:pt x="15356" y="0"/>
+                  </a:lnTo>
+                  <a:lnTo>
+                    <a:pt x="0" y="0"/>
+                  </a:lnTo>
+                  <a:close/>
+                  <a:moveTo>
+                    <a:pt x="14748" y="8038"/>
+                  </a:moveTo>
+                  <a:lnTo>
+                    <a:pt x="600" y="8038"/>
+                  </a:lnTo>
+                  <a:lnTo>
+                    <a:pt x="600" y="592"/>
+                  </a:lnTo>
+                  <a:lnTo>
+                    <a:pt x="14748" y="592"/>
+                  </a:lnTo>
+                  <a:lnTo>
+                    <a:pt x="14748" y="8038"/>
+                  </a:lnTo>
+                  <a:close/>
+                </a:path>
+              </a:pathLst>
+            </a:custGeom>
+            <a:ln>
+              <a:noFill/>
+            </a:ln>
+          </p:spPr>
+          <p:style>
+            <a:lnRef idx="0">
+              <a:scrgbClr r="0" g="0" b="0"/>
+            </a:lnRef>
+            <a:fillRef idx="1002">
+              <a:schemeClr val="dk2"/>
+            </a:fillRef>
+            <a:effectRef idx="0">
+              <a:scrgbClr r="0" g="0" b="0"/>
+            </a:effectRef>
+            <a:fontRef idx="major"/>
+          </p:style>
+          <p:txBody>
+            <a:bodyPr/>
+            <a:lstStyle/>
+            <a:p>
+              <a:endParaRPr lang="en-US"/>
+            </a:p>
+          </p:txBody>
+        </p:sp>
+      </p:grpSp>
+      <p:sp>
+        <p:nvSpPr>
+          <p:cNvPr id="2" name="Title 1">
+            <a:extLst>
+              <a:ext uri="{FF2B5EF4-FFF2-40B4-BE49-F238E27FC236}">
+                <a16:creationId xmlns:a16="http://schemas.microsoft.com/office/drawing/2014/main" id="{A84D4C4E-828F-435B-3884-660745BB30FB}"/>
+              </a:ext>
+            </a:extLst>
+          </p:cNvPr>
+          <p:cNvSpPr>
+            <a:spLocks noGrp="1"/>
+          </p:cNvSpPr>
+          <p:nvPr>
+            <p:ph type="title"/>
+          </p:nvPr>
+        </p:nvSpPr>
+        <p:spPr>
+          <a:xfrm>
+            <a:off x="1000372" y="1209957"/>
+            <a:ext cx="3034580" cy="4438087"/>
+          </a:xfrm>
+        </p:spPr>
+        <p:txBody>
+          <a:bodyPr anchor="ctr">
+            <a:normAutofit/>
+          </a:bodyPr>
+          <a:lstStyle/>
+          <a:p>
+            <a:pPr algn="r"/>
+            <a:r>
+              <a:rPr lang="en-US" sz="3200" dirty="0">
+                <a:solidFill>
+                  <a:schemeClr val="tx1"/>
+                </a:solidFill>
+              </a:rPr>
+              <a:t>The ELM in </a:t>
+            </a:r>
+            <a:r>
+              <a:rPr lang="en-US" sz="3200" dirty="0" err="1">
+                <a:solidFill>
+                  <a:schemeClr val="tx1"/>
+                </a:solidFill>
+              </a:rPr>
+              <a:t>CausalELM</a:t>
+            </a:r>
+            <a:endParaRPr lang="en-US" sz="3200" dirty="0">
+              <a:solidFill>
+                <a:schemeClr val="tx1"/>
+              </a:solidFill>
+            </a:endParaRPr>
+          </a:p>
+        </p:txBody>
+      </p:sp>
+      <p:cxnSp>
+        <p:nvCxnSpPr>
+          <p:cNvPr id="18" name="Straight Connector 17">
+            <a:extLst>
+              <a:ext uri="{FF2B5EF4-FFF2-40B4-BE49-F238E27FC236}">
+                <a16:creationId xmlns:a16="http://schemas.microsoft.com/office/drawing/2014/main" id="{AD23B2CD-009B-425A-9616-1E1AD1D5AB46}"/>
+              </a:ext>
+              <a:ext uri="{C183D7F6-B498-43B3-948B-1728B52AA6E4}">
+                <adec:decorative xmlns:adec="http://schemas.microsoft.com/office/drawing/2017/decorative" val="1"/>
+              </a:ext>
+            </a:extLst>
+          </p:cNvPr>
+          <p:cNvCxnSpPr>
+            <a:cxnSpLocks noGrp="1" noRot="1" noChangeAspect="1" noMove="1" noResize="1" noEditPoints="1" noAdjustHandles="1" noChangeArrowheads="1" noChangeShapeType="1"/>
+          </p:cNvCxnSpPr>
+          <p:nvPr>
+            <p:extLst>
+              <p:ext uri="{386F3935-93C4-4BCD-93E2-E3B085C9AB24}">
+                <p16:designElem xmlns:p16="http://schemas.microsoft.com/office/powerpoint/2015/main" val="1"/>
+              </p:ext>
+            </p:extLst>
+          </p:nvPr>
+        </p:nvCxnSpPr>
+        <p:spPr>
+          <a:xfrm>
+            <a:off x="4356687" y="1930986"/>
+            <a:ext cx="0" cy="3200400"/>
+          </a:xfrm>
+          <a:prstGeom prst="line">
+            <a:avLst/>
+          </a:prstGeom>
+          <a:ln w="15875" cap="sq">
+            <a:solidFill>
+              <a:schemeClr val="tx2"/>
+            </a:solidFill>
+            <a:miter lim="800000"/>
+          </a:ln>
+        </p:spPr>
+        <p:style>
+          <a:lnRef idx="1">
+            <a:schemeClr val="accent1"/>
+          </a:lnRef>
+          <a:fillRef idx="0">
+            <a:schemeClr val="accent1"/>
+          </a:fillRef>
+          <a:effectRef idx="0">
+            <a:schemeClr val="accent1"/>
+          </a:effectRef>
+          <a:fontRef idx="minor">
+            <a:schemeClr val="tx1"/>
+          </a:fontRef>
+        </p:style>
+      </p:cxnSp>
+      <p:sp>
+        <p:nvSpPr>
+          <p:cNvPr id="3" name="Content Placeholder 2">
+            <a:extLst>
+              <a:ext uri="{FF2B5EF4-FFF2-40B4-BE49-F238E27FC236}">
+                <a16:creationId xmlns:a16="http://schemas.microsoft.com/office/drawing/2014/main" id="{BD8F71ED-D79F-6422-58BC-18D4B5BDD63D}"/>
+              </a:ext>
+            </a:extLst>
+          </p:cNvPr>
+          <p:cNvSpPr>
+            <a:spLocks noGrp="1"/>
+          </p:cNvSpPr>
+          <p:nvPr>
+            <p:ph idx="1"/>
+          </p:nvPr>
+        </p:nvSpPr>
+        <p:spPr>
+          <a:xfrm>
+            <a:off x="4678424" y="1059025"/>
+            <a:ext cx="5302189" cy="4739950"/>
+          </a:xfrm>
+        </p:spPr>
+        <p:txBody>
+          <a:bodyPr anchor="ctr">
+            <a:normAutofit lnSpcReduction="10000"/>
+          </a:bodyPr>
+          <a:lstStyle/>
+          <a:p>
+            <a:r>
+              <a:rPr lang="en-US" sz="3300" dirty="0">
+                <a:solidFill>
+                  <a:schemeClr val="tx1"/>
+                </a:solidFill>
+              </a:rPr>
+              <a:t>Ensemble of ELMs</a:t>
+            </a:r>
+          </a:p>
+          <a:p>
+            <a:pPr lvl="1"/>
+            <a:r>
+              <a:rPr lang="en-US" sz="3100" dirty="0">
+                <a:solidFill>
+                  <a:schemeClr val="tx1"/>
+                </a:solidFill>
+              </a:rPr>
+              <a:t>Uses bagging strategy</a:t>
+            </a:r>
+          </a:p>
+          <a:p>
+            <a:pPr lvl="1"/>
+            <a:r>
+              <a:rPr lang="en-US" sz="3100" dirty="0">
+                <a:solidFill>
+                  <a:schemeClr val="tx1"/>
+                </a:solidFill>
+              </a:rPr>
+              <a:t>Provides regularization</a:t>
+            </a:r>
+          </a:p>
+          <a:p>
+            <a:pPr lvl="1"/>
+            <a:r>
+              <a:rPr lang="en-US" sz="3100" dirty="0">
+                <a:solidFill>
+                  <a:schemeClr val="tx1"/>
+                </a:solidFill>
+              </a:rPr>
+              <a:t>Enables probabilistic outputs</a:t>
+            </a:r>
+          </a:p>
+          <a:p>
+            <a:r>
+              <a:rPr lang="en-US" sz="3300" dirty="0">
+                <a:solidFill>
+                  <a:schemeClr val="tx1"/>
+                </a:solidFill>
+              </a:rPr>
+              <a:t>Activation functions</a:t>
+            </a:r>
+          </a:p>
+          <a:p>
+            <a:pPr lvl="1"/>
+            <a:r>
+              <a:rPr lang="en-US" sz="3100" dirty="0">
+                <a:solidFill>
+                  <a:schemeClr val="tx1"/>
+                </a:solidFill>
+              </a:rPr>
+              <a:t>Provide regularization</a:t>
+            </a:r>
+          </a:p>
+          <a:p>
+            <a:pPr lvl="1"/>
+            <a:r>
+              <a:rPr lang="en-US" sz="3100" dirty="0">
+                <a:solidFill>
+                  <a:schemeClr val="tx1"/>
+                </a:solidFill>
+              </a:rPr>
+              <a:t>Can greatly improve performance</a:t>
+            </a:r>
+          </a:p>
+          <a:p>
+            <a:pPr lvl="1"/>
+            <a:endParaRPr lang="en-US" sz="3100" b="1" dirty="0">
+              <a:solidFill>
+                <a:schemeClr val="tx1"/>
+              </a:solidFill>
+            </a:endParaRPr>
+          </a:p>
+        </p:txBody>
+      </p:sp>
+      <p:sp>
+        <p:nvSpPr>
+          <p:cNvPr id="4" name="Footer Placeholder 3">
+            <a:extLst>
+              <a:ext uri="{FF2B5EF4-FFF2-40B4-BE49-F238E27FC236}">
+                <a16:creationId xmlns:a16="http://schemas.microsoft.com/office/drawing/2014/main" id="{175F7354-92CD-6976-6C25-D95B189AA0D0}"/>
+              </a:ext>
+            </a:extLst>
+          </p:cNvPr>
+          <p:cNvSpPr>
+            <a:spLocks noGrp="1"/>
+          </p:cNvSpPr>
+          <p:nvPr>
+            <p:ph type="ftr" sz="quarter" idx="11"/>
+          </p:nvPr>
+        </p:nvSpPr>
+        <p:spPr>
+          <a:xfrm rot="5400000">
+            <a:off x="9521207" y="3155806"/>
+            <a:ext cx="3859795" cy="304801"/>
+          </a:xfrm>
+        </p:spPr>
+        <p:txBody>
+          <a:bodyPr>
+            <a:noAutofit/>
+          </a:bodyPr>
+          <a:lstStyle/>
+          <a:p>
+            <a:pPr>
+              <a:spcAft>
+                <a:spcPts val="600"/>
+              </a:spcAft>
+            </a:pPr>
+            <a:r>
+              <a:rPr lang="en-US" sz="1600" dirty="0" err="1">
+                <a:solidFill>
+                  <a:srgbClr val="FFFFFF"/>
+                </a:solidFill>
+              </a:rPr>
+              <a:t>JuliaCon</a:t>
+            </a:r>
+            <a:r>
+              <a:rPr lang="en-US" sz="1600" dirty="0">
+                <a:solidFill>
+                  <a:srgbClr val="FFFFFF"/>
+                </a:solidFill>
+              </a:rPr>
+              <a:t> 2024</a:t>
+            </a:r>
+          </a:p>
+        </p:txBody>
+      </p:sp>
+      <p:sp>
+        <p:nvSpPr>
+          <p:cNvPr id="5" name="Slide Number Placeholder 4">
+            <a:extLst>
+              <a:ext uri="{FF2B5EF4-FFF2-40B4-BE49-F238E27FC236}">
+                <a16:creationId xmlns:a16="http://schemas.microsoft.com/office/drawing/2014/main" id="{4FD4784B-5FB1-F9DD-BC87-BFA1B0E38598}"/>
+              </a:ext>
+            </a:extLst>
+          </p:cNvPr>
+          <p:cNvSpPr>
+            <a:spLocks noGrp="1"/>
+          </p:cNvSpPr>
+          <p:nvPr>
+            <p:ph type="sldNum" sz="quarter" idx="12"/>
+          </p:nvPr>
+        </p:nvSpPr>
+        <p:spPr>
+          <a:xfrm>
+            <a:off x="11017538" y="610622"/>
+            <a:ext cx="685802" cy="766675"/>
+          </a:xfrm>
+        </p:spPr>
+        <p:txBody>
+          <a:bodyPr anchor="ctr">
+            <a:normAutofit/>
+          </a:bodyPr>
+          <a:lstStyle/>
+          <a:p>
+            <a:pPr>
+              <a:spcAft>
+                <a:spcPts val="600"/>
+              </a:spcAft>
+            </a:pPr>
+            <a:fld id="{D57F1E4F-1CFF-5643-939E-217C01CDF565}" type="slidenum">
+              <a:rPr lang="en-US" sz="2000">
+                <a:solidFill>
+                  <a:srgbClr val="FFFFFF"/>
+                </a:solidFill>
+              </a:rPr>
+              <a:pPr>
+                <a:spcAft>
+                  <a:spcPts val="600"/>
+                </a:spcAft>
+              </a:pPr>
+              <a:t>20</a:t>
+            </a:fld>
+            <a:endParaRPr lang="en-US" sz="2000">
+              <a:solidFill>
+                <a:srgbClr val="FFFFFF"/>
+              </a:solidFill>
+            </a:endParaRPr>
+          </a:p>
+        </p:txBody>
+      </p:sp>
+    </p:spTree>
+    <p:extLst>
+      <p:ext uri="{BB962C8B-B14F-4D97-AF65-F5344CB8AC3E}">
+        <p14:creationId xmlns:p14="http://schemas.microsoft.com/office/powerpoint/2010/main" val="2282884680"/>
+      </p:ext>
+    </p:extLst>
+  </p:cSld>
+  <p:clrMapOvr>
+    <a:masterClrMapping/>
+  </p:clrMapOvr>
+</p:sld>
+</file>
+
+<file path=ppt/slides/slide21.xml><?xml version="1.0" encoding="utf-8"?>
+<p:sld xmlns:a="http://schemas.openxmlformats.org/drawingml/2006/main" xmlns:r="http://schemas.openxmlformats.org/officeDocument/2006/relationships" xmlns:p="http://schemas.openxmlformats.org/presentationml/2006/main">
+  <p:cSld>
+    <p:bg>
+      <p:bgPr>
+        <a:solidFill>
           <a:schemeClr val="bg2"/>
         </a:solidFill>
         <a:effectLst/>
@@ -33091,7 +34130,7 @@
                   <a:spcPts val="600"/>
                 </a:spcAft>
               </a:pPr>
-              <a:t>20</a:t>
+              <a:t>21</a:t>
             </a:fld>
             <a:endParaRPr lang="en-US">
               <a:solidFill>
@@ -33189,7 +34228,7 @@
 </p:sld>
 </file>
 
-<file path=ppt/slides/slide21.xml><?xml version="1.0" encoding="utf-8"?>
+<file path=ppt/slides/slide22.xml><?xml version="1.0" encoding="utf-8"?>
 <p:sld xmlns:a="http://schemas.openxmlformats.org/drawingml/2006/main" xmlns:r="http://schemas.openxmlformats.org/officeDocument/2006/relationships" xmlns:p="http://schemas.openxmlformats.org/presentationml/2006/main">
   <p:cSld>
     <p:bg>
@@ -34124,7 +35163,7 @@
                   <a:spcPts val="600"/>
                 </a:spcAft>
               </a:pPr>
-              <a:t>21</a:t>
+              <a:t>22</a:t>
             </a:fld>
             <a:endParaRPr lang="en-US">
               <a:solidFill>
@@ -34222,7 +35261,7 @@
 </p:sld>
 </file>
 
-<file path=ppt/slides/slide22.xml><?xml version="1.0" encoding="utf-8"?>
+<file path=ppt/slides/slide23.xml><?xml version="1.0" encoding="utf-8"?>
 <p:sld xmlns:a="http://schemas.openxmlformats.org/drawingml/2006/main" xmlns:r="http://schemas.openxmlformats.org/officeDocument/2006/relationships" xmlns:p="http://schemas.openxmlformats.org/presentationml/2006/main">
   <p:cSld>
     <p:bg>
@@ -34734,7 +35773,7 @@
                   <a:spcPts val="600"/>
                 </a:spcAft>
               </a:pPr>
-              <a:t>22</a:t>
+              <a:t>23</a:t>
             </a:fld>
             <a:endParaRPr lang="en-US">
               <a:solidFill>
@@ -34866,7 +35905,7 @@
 </p:sld>
 </file>
 
-<file path=ppt/slides/slide23.xml><?xml version="1.0" encoding="utf-8"?>
+<file path=ppt/slides/slide24.xml><?xml version="1.0" encoding="utf-8"?>
 <p:sld xmlns:a="http://schemas.openxmlformats.org/drawingml/2006/main" xmlns:r="http://schemas.openxmlformats.org/officeDocument/2006/relationships" xmlns:p="http://schemas.openxmlformats.org/presentationml/2006/main">
   <p:cSld>
     <p:bg>
@@ -35378,7 +36417,7 @@
                   <a:spcPts val="600"/>
                 </a:spcAft>
               </a:pPr>
-              <a:t>23</a:t>
+              <a:t>24</a:t>
             </a:fld>
             <a:endParaRPr lang="en-US">
               <a:solidFill>

</xml_diff>